<commit_message>
fixed layout issues with 3.5 screen size and created submission screenshots
</commit_message>
<xml_diff>
--- a/drawings/drawings.pptx
+++ b/drawings/drawings.pptx
@@ -247,7 +247,7 @@
           <a:p>
             <a:fld id="{7683D8CA-F43E-124B-AB4D-62223CDC2FAF}" type="datetimeFigureOut">
               <a:rPr lang="en-US" smtClean="0"/>
-              <a:t>9/23/15</a:t>
+              <a:t>11/11/15</a:t>
             </a:fld>
             <a:endParaRPr lang="en-US"/>
           </a:p>
@@ -1324,7 +1324,7 @@
           <a:p>
             <a:fld id="{0020FEAD-68D7-EE4B-A194-60FBEF693A60}" type="datetimeFigureOut">
               <a:rPr lang="en-US" smtClean="0"/>
-              <a:t>9/23/15</a:t>
+              <a:t>11/11/15</a:t>
             </a:fld>
             <a:endParaRPr lang="en-US"/>
           </a:p>
@@ -1494,7 +1494,7 @@
           <a:p>
             <a:fld id="{0020FEAD-68D7-EE4B-A194-60FBEF693A60}" type="datetimeFigureOut">
               <a:rPr lang="en-US" smtClean="0"/>
-              <a:t>9/23/15</a:t>
+              <a:t>11/11/15</a:t>
             </a:fld>
             <a:endParaRPr lang="en-US"/>
           </a:p>
@@ -1674,7 +1674,7 @@
           <a:p>
             <a:fld id="{0020FEAD-68D7-EE4B-A194-60FBEF693A60}" type="datetimeFigureOut">
               <a:rPr lang="en-US" smtClean="0"/>
-              <a:t>9/23/15</a:t>
+              <a:t>11/11/15</a:t>
             </a:fld>
             <a:endParaRPr lang="en-US"/>
           </a:p>
@@ -1844,7 +1844,7 @@
           <a:p>
             <a:fld id="{0020FEAD-68D7-EE4B-A194-60FBEF693A60}" type="datetimeFigureOut">
               <a:rPr lang="en-US" smtClean="0"/>
-              <a:t>9/23/15</a:t>
+              <a:t>11/11/15</a:t>
             </a:fld>
             <a:endParaRPr lang="en-US"/>
           </a:p>
@@ -2090,7 +2090,7 @@
           <a:p>
             <a:fld id="{0020FEAD-68D7-EE4B-A194-60FBEF693A60}" type="datetimeFigureOut">
               <a:rPr lang="en-US" smtClean="0"/>
-              <a:t>9/23/15</a:t>
+              <a:t>11/11/15</a:t>
             </a:fld>
             <a:endParaRPr lang="en-US"/>
           </a:p>
@@ -2378,7 +2378,7 @@
           <a:p>
             <a:fld id="{0020FEAD-68D7-EE4B-A194-60FBEF693A60}" type="datetimeFigureOut">
               <a:rPr lang="en-US" smtClean="0"/>
-              <a:t>9/23/15</a:t>
+              <a:t>11/11/15</a:t>
             </a:fld>
             <a:endParaRPr lang="en-US"/>
           </a:p>
@@ -2800,7 +2800,7 @@
           <a:p>
             <a:fld id="{0020FEAD-68D7-EE4B-A194-60FBEF693A60}" type="datetimeFigureOut">
               <a:rPr lang="en-US" smtClean="0"/>
-              <a:t>9/23/15</a:t>
+              <a:t>11/11/15</a:t>
             </a:fld>
             <a:endParaRPr lang="en-US"/>
           </a:p>
@@ -2918,7 +2918,7 @@
           <a:p>
             <a:fld id="{0020FEAD-68D7-EE4B-A194-60FBEF693A60}" type="datetimeFigureOut">
               <a:rPr lang="en-US" smtClean="0"/>
-              <a:t>9/23/15</a:t>
+              <a:t>11/11/15</a:t>
             </a:fld>
             <a:endParaRPr lang="en-US"/>
           </a:p>
@@ -3013,7 +3013,7 @@
           <a:p>
             <a:fld id="{0020FEAD-68D7-EE4B-A194-60FBEF693A60}" type="datetimeFigureOut">
               <a:rPr lang="en-US" smtClean="0"/>
-              <a:t>9/23/15</a:t>
+              <a:t>11/11/15</a:t>
             </a:fld>
             <a:endParaRPr lang="en-US"/>
           </a:p>
@@ -3290,7 +3290,7 @@
           <a:p>
             <a:fld id="{0020FEAD-68D7-EE4B-A194-60FBEF693A60}" type="datetimeFigureOut">
               <a:rPr lang="en-US" smtClean="0"/>
-              <a:t>9/23/15</a:t>
+              <a:t>11/11/15</a:t>
             </a:fld>
             <a:endParaRPr lang="en-US"/>
           </a:p>
@@ -3543,7 +3543,7 @@
           <a:p>
             <a:fld id="{0020FEAD-68D7-EE4B-A194-60FBEF693A60}" type="datetimeFigureOut">
               <a:rPr lang="en-US" smtClean="0"/>
-              <a:t>9/23/15</a:t>
+              <a:t>11/11/15</a:t>
             </a:fld>
             <a:endParaRPr lang="en-US"/>
           </a:p>
@@ -3756,7 +3756,7 @@
           <a:p>
             <a:fld id="{0020FEAD-68D7-EE4B-A194-60FBEF693A60}" type="datetimeFigureOut">
               <a:rPr lang="en-US" smtClean="0"/>
-              <a:t>9/23/15</a:t>
+              <a:t>11/11/15</a:t>
             </a:fld>
             <a:endParaRPr lang="en-US"/>
           </a:p>
@@ -32107,494 +32107,47 @@
           <a:chExt cx="0" cy="0"/>
         </a:xfrm>
       </p:grpSpPr>
-      <p:sp>
-        <p:nvSpPr>
-          <p:cNvPr id="5" name="Rectangle 4"/>
-          <p:cNvSpPr/>
-          <p:nvPr/>
-        </p:nvSpPr>
-        <p:spPr>
-          <a:xfrm>
-            <a:off x="986118" y="1867647"/>
-            <a:ext cx="4811058" cy="3167530"/>
-          </a:xfrm>
-          <a:prstGeom prst="rect">
-            <a:avLst/>
-          </a:prstGeom>
-          <a:gradFill>
-            <a:gsLst>
-              <a:gs pos="0">
-                <a:schemeClr val="tx2"/>
-              </a:gs>
-              <a:gs pos="100000">
-                <a:schemeClr val="tx2">
-                  <a:lumMod val="60000"/>
-                  <a:lumOff val="40000"/>
-                </a:schemeClr>
-              </a:gs>
-            </a:gsLst>
-          </a:gradFill>
-          <a:ln>
-            <a:noFill/>
-          </a:ln>
-          <a:effectLst/>
-        </p:spPr>
-        <p:style>
-          <a:lnRef idx="1">
-            <a:schemeClr val="accent1"/>
-          </a:lnRef>
-          <a:fillRef idx="3">
-            <a:schemeClr val="accent1"/>
-          </a:fillRef>
-          <a:effectRef idx="2">
-            <a:schemeClr val="accent1"/>
-          </a:effectRef>
-          <a:fontRef idx="minor">
-            <a:schemeClr val="lt1"/>
-          </a:fontRef>
-        </p:style>
-        <p:txBody>
-          <a:bodyPr rtlCol="0" anchor="ctr"/>
-          <a:lstStyle/>
-          <a:p>
-            <a:pPr algn="ctr"/>
-            <a:endParaRPr lang="en-US"/>
-          </a:p>
-        </p:txBody>
-      </p:sp>
-      <p:sp>
-        <p:nvSpPr>
-          <p:cNvPr id="4" name="Rectangle 3"/>
-          <p:cNvSpPr/>
-          <p:nvPr/>
-        </p:nvSpPr>
-        <p:spPr>
-          <a:xfrm>
-            <a:off x="2712114" y="2529154"/>
-            <a:ext cx="1073825" cy="744512"/>
-          </a:xfrm>
-          <a:prstGeom prst="rect">
-            <a:avLst/>
-          </a:prstGeom>
-          <a:solidFill>
-            <a:schemeClr val="bg1"/>
-          </a:solidFill>
-          <a:ln>
-            <a:noFill/>
-          </a:ln>
-          <a:effectLst/>
-        </p:spPr>
-        <p:style>
-          <a:lnRef idx="1">
-            <a:schemeClr val="accent1"/>
-          </a:lnRef>
-          <a:fillRef idx="3">
-            <a:schemeClr val="accent1"/>
-          </a:fillRef>
-          <a:effectRef idx="2">
-            <a:schemeClr val="accent1"/>
-          </a:effectRef>
-          <a:fontRef idx="minor">
-            <a:schemeClr val="lt1"/>
-          </a:fontRef>
-        </p:style>
-        <p:txBody>
-          <a:bodyPr rtlCol="0" anchor="ctr"/>
-          <a:lstStyle/>
-          <a:p>
-            <a:pPr algn="ctr"/>
-            <a:endParaRPr lang="en-US"/>
-          </a:p>
-        </p:txBody>
-      </p:sp>
-      <p:sp>
-        <p:nvSpPr>
-          <p:cNvPr id="12" name="Rounded Rectangle 11"/>
-          <p:cNvSpPr/>
-          <p:nvPr/>
-        </p:nvSpPr>
-        <p:spPr>
-          <a:xfrm>
-            <a:off x="3679361" y="3069949"/>
-            <a:ext cx="340188" cy="117844"/>
-          </a:xfrm>
-          <a:prstGeom prst="roundRect">
-            <a:avLst/>
-          </a:prstGeom>
-          <a:solidFill>
-            <a:srgbClr val="FFFFFF"/>
-          </a:solidFill>
-          <a:ln>
-            <a:noFill/>
-          </a:ln>
-          <a:effectLst/>
-        </p:spPr>
-        <p:style>
-          <a:lnRef idx="1">
-            <a:schemeClr val="accent1"/>
-          </a:lnRef>
-          <a:fillRef idx="3">
-            <a:schemeClr val="accent1"/>
-          </a:fillRef>
-          <a:effectRef idx="2">
-            <a:schemeClr val="accent1"/>
-          </a:effectRef>
-          <a:fontRef idx="minor">
-            <a:schemeClr val="lt1"/>
-          </a:fontRef>
-        </p:style>
-        <p:txBody>
-          <a:bodyPr rtlCol="0" anchor="ctr"/>
-          <a:lstStyle/>
-          <a:p>
-            <a:pPr algn="ctr"/>
-            <a:endParaRPr lang="en-US"/>
-          </a:p>
-        </p:txBody>
-      </p:sp>
-      <p:sp>
-        <p:nvSpPr>
-          <p:cNvPr id="2" name="Rectangle 1"/>
-          <p:cNvSpPr/>
-          <p:nvPr/>
-        </p:nvSpPr>
-        <p:spPr>
-          <a:xfrm>
-            <a:off x="2581221" y="4307148"/>
-            <a:ext cx="1335610" cy="201473"/>
-          </a:xfrm>
-          <a:prstGeom prst="rect">
-            <a:avLst/>
-          </a:prstGeom>
-          <a:solidFill>
-            <a:srgbClr val="FFFFFF"/>
-          </a:solidFill>
-          <a:ln>
-            <a:noFill/>
-          </a:ln>
-          <a:effectLst/>
-        </p:spPr>
-        <p:style>
-          <a:lnRef idx="1">
-            <a:schemeClr val="accent1"/>
-          </a:lnRef>
-          <a:fillRef idx="3">
-            <a:schemeClr val="accent1"/>
-          </a:fillRef>
-          <a:effectRef idx="2">
-            <a:schemeClr val="accent1"/>
-          </a:effectRef>
-          <a:fontRef idx="minor">
-            <a:schemeClr val="lt1"/>
-          </a:fontRef>
-        </p:style>
-        <p:txBody>
-          <a:bodyPr rtlCol="0" anchor="ctr"/>
-          <a:lstStyle/>
-          <a:p>
-            <a:pPr algn="ctr"/>
-            <a:endParaRPr lang="en-US"/>
-          </a:p>
-        </p:txBody>
-      </p:sp>
-      <p:sp>
-        <p:nvSpPr>
-          <p:cNvPr id="9" name="Rectangle 8"/>
-          <p:cNvSpPr/>
-          <p:nvPr/>
-        </p:nvSpPr>
-        <p:spPr>
-          <a:xfrm>
-            <a:off x="2899666" y="2683752"/>
-            <a:ext cx="698721" cy="470807"/>
-          </a:xfrm>
-          <a:prstGeom prst="rect">
-            <a:avLst/>
-          </a:prstGeom>
-          <a:ln>
-            <a:noFill/>
-          </a:ln>
-          <a:effectLst/>
-        </p:spPr>
-        <p:style>
-          <a:lnRef idx="1">
-            <a:schemeClr val="accent1"/>
-          </a:lnRef>
-          <a:fillRef idx="3">
-            <a:schemeClr val="accent1"/>
-          </a:fillRef>
-          <a:effectRef idx="2">
-            <a:schemeClr val="accent1"/>
-          </a:effectRef>
-          <a:fontRef idx="minor">
-            <a:schemeClr val="lt1"/>
-          </a:fontRef>
-        </p:style>
-        <p:txBody>
-          <a:bodyPr rtlCol="0" anchor="ctr"/>
-          <a:lstStyle/>
-          <a:p>
-            <a:pPr algn="ctr"/>
-            <a:endParaRPr lang="en-US"/>
-          </a:p>
-        </p:txBody>
-      </p:sp>
-      <p:sp>
-        <p:nvSpPr>
-          <p:cNvPr id="20" name="Rounded Rectangle 19"/>
-          <p:cNvSpPr/>
-          <p:nvPr/>
-        </p:nvSpPr>
-        <p:spPr>
-          <a:xfrm rot="3219055">
-            <a:off x="3907823" y="2906710"/>
-            <a:ext cx="413246" cy="88813"/>
-          </a:xfrm>
-          <a:prstGeom prst="roundRect">
-            <a:avLst/>
-          </a:prstGeom>
-          <a:solidFill>
-            <a:srgbClr val="FFFFFF"/>
-          </a:solidFill>
-          <a:ln>
-            <a:noFill/>
-          </a:ln>
-          <a:effectLst/>
-        </p:spPr>
-        <p:style>
-          <a:lnRef idx="1">
-            <a:schemeClr val="accent1"/>
-          </a:lnRef>
-          <a:fillRef idx="3">
-            <a:schemeClr val="accent1"/>
-          </a:fillRef>
-          <a:effectRef idx="2">
-            <a:schemeClr val="accent1"/>
-          </a:effectRef>
-          <a:fontRef idx="minor">
-            <a:schemeClr val="lt1"/>
-          </a:fontRef>
-        </p:style>
-        <p:txBody>
-          <a:bodyPr rtlCol="0" anchor="ctr"/>
-          <a:lstStyle/>
-          <a:p>
-            <a:pPr algn="ctr"/>
-            <a:endParaRPr lang="en-US"/>
-          </a:p>
-        </p:txBody>
-      </p:sp>
-      <p:sp>
-        <p:nvSpPr>
-          <p:cNvPr id="24" name="Rounded Rectangle 23"/>
-          <p:cNvSpPr/>
-          <p:nvPr/>
-        </p:nvSpPr>
-        <p:spPr>
-          <a:xfrm>
-            <a:off x="3953987" y="3070062"/>
-            <a:ext cx="100396" cy="1162485"/>
-          </a:xfrm>
-          <a:prstGeom prst="roundRect">
-            <a:avLst/>
-          </a:prstGeom>
-          <a:solidFill>
-            <a:schemeClr val="bg1"/>
-          </a:solidFill>
-          <a:ln>
-            <a:noFill/>
-          </a:ln>
-          <a:effectLst/>
-        </p:spPr>
-        <p:style>
-          <a:lnRef idx="1">
-            <a:schemeClr val="accent1"/>
-          </a:lnRef>
-          <a:fillRef idx="3">
-            <a:schemeClr val="accent1"/>
-          </a:fillRef>
-          <a:effectRef idx="2">
-            <a:schemeClr val="accent1"/>
-          </a:effectRef>
-          <a:fontRef idx="minor">
-            <a:schemeClr val="lt1"/>
-          </a:fontRef>
-        </p:style>
-        <p:txBody>
-          <a:bodyPr rtlCol="0" anchor="ctr"/>
-          <a:lstStyle/>
-          <a:p>
-            <a:pPr algn="ctr"/>
-            <a:endParaRPr lang="en-US"/>
-          </a:p>
-        </p:txBody>
-      </p:sp>
-      <p:sp>
-        <p:nvSpPr>
-          <p:cNvPr id="35" name="Rounded Rectangle 34"/>
-          <p:cNvSpPr/>
-          <p:nvPr/>
-        </p:nvSpPr>
-        <p:spPr>
-          <a:xfrm rot="5400000">
-            <a:off x="4069514" y="4036470"/>
-            <a:ext cx="100396" cy="291760"/>
-          </a:xfrm>
-          <a:prstGeom prst="roundRect">
-            <a:avLst/>
-          </a:prstGeom>
-          <a:solidFill>
-            <a:schemeClr val="bg1"/>
-          </a:solidFill>
-          <a:ln>
-            <a:noFill/>
-          </a:ln>
-          <a:effectLst/>
-        </p:spPr>
-        <p:style>
-          <a:lnRef idx="1">
-            <a:schemeClr val="accent1"/>
-          </a:lnRef>
-          <a:fillRef idx="3">
-            <a:schemeClr val="accent1"/>
-          </a:fillRef>
-          <a:effectRef idx="2">
-            <a:schemeClr val="accent1"/>
-          </a:effectRef>
-          <a:fontRef idx="minor">
-            <a:schemeClr val="lt1"/>
-          </a:fontRef>
-        </p:style>
-        <p:txBody>
-          <a:bodyPr rtlCol="0" anchor="ctr"/>
-          <a:lstStyle/>
-          <a:p>
-            <a:pPr algn="ctr"/>
-            <a:endParaRPr lang="en-US"/>
-          </a:p>
-        </p:txBody>
-      </p:sp>
-      <p:sp>
-        <p:nvSpPr>
-          <p:cNvPr id="36" name="Rounded Rectangle 35"/>
-          <p:cNvSpPr/>
-          <p:nvPr/>
-        </p:nvSpPr>
-        <p:spPr>
-          <a:xfrm>
-            <a:off x="4170018" y="3069949"/>
-            <a:ext cx="100396" cy="1162599"/>
-          </a:xfrm>
-          <a:prstGeom prst="roundRect">
-            <a:avLst/>
-          </a:prstGeom>
-          <a:solidFill>
-            <a:schemeClr val="bg1"/>
-          </a:solidFill>
-          <a:ln>
-            <a:noFill/>
-          </a:ln>
-          <a:effectLst/>
-        </p:spPr>
-        <p:style>
-          <a:lnRef idx="1">
-            <a:schemeClr val="accent1"/>
-          </a:lnRef>
-          <a:fillRef idx="3">
-            <a:schemeClr val="accent1"/>
-          </a:fillRef>
-          <a:effectRef idx="2">
-            <a:schemeClr val="accent1"/>
-          </a:effectRef>
-          <a:fontRef idx="minor">
-            <a:schemeClr val="lt1"/>
-          </a:fontRef>
-        </p:style>
-        <p:txBody>
-          <a:bodyPr rtlCol="0" anchor="ctr"/>
-          <a:lstStyle/>
-          <a:p>
-            <a:pPr algn="ctr"/>
-            <a:endParaRPr lang="en-US"/>
-          </a:p>
-        </p:txBody>
-      </p:sp>
-      <p:sp>
-        <p:nvSpPr>
-          <p:cNvPr id="18" name="Rectangle 17"/>
-          <p:cNvSpPr/>
-          <p:nvPr/>
-        </p:nvSpPr>
-        <p:spPr>
-          <a:xfrm>
-            <a:off x="2757134" y="3187793"/>
-            <a:ext cx="983785" cy="1186218"/>
-          </a:xfrm>
-          <a:prstGeom prst="rect">
-            <a:avLst/>
-          </a:prstGeom>
-          <a:solidFill>
-            <a:schemeClr val="bg1"/>
-          </a:solidFill>
-          <a:ln>
-            <a:noFill/>
-          </a:ln>
-          <a:effectLst/>
-        </p:spPr>
-        <p:style>
-          <a:lnRef idx="1">
-            <a:schemeClr val="accent1"/>
-          </a:lnRef>
-          <a:fillRef idx="3">
-            <a:schemeClr val="accent1"/>
-          </a:fillRef>
-          <a:effectRef idx="2">
-            <a:schemeClr val="accent1"/>
-          </a:effectRef>
-          <a:fontRef idx="minor">
-            <a:schemeClr val="lt1"/>
-          </a:fontRef>
-        </p:style>
-        <p:txBody>
-          <a:bodyPr rtlCol="0" anchor="ctr"/>
-          <a:lstStyle/>
-          <a:p>
-            <a:pPr algn="ctr"/>
-            <a:endParaRPr lang="en-US"/>
-          </a:p>
-        </p:txBody>
-      </p:sp>
       <p:grpSp>
         <p:nvGrpSpPr>
-          <p:cNvPr id="3" name="Group 2"/>
+          <p:cNvPr id="7" name="Group 6"/>
           <p:cNvGrpSpPr/>
           <p:nvPr/>
         </p:nvGrpSpPr>
         <p:grpSpPr>
           <a:xfrm>
-            <a:off x="2843776" y="3390996"/>
-            <a:ext cx="810501" cy="813729"/>
-            <a:chOff x="2858712" y="3390996"/>
-            <a:chExt cx="810501" cy="813729"/>
+            <a:off x="2448148" y="1867646"/>
+            <a:ext cx="7062741" cy="7078798"/>
+            <a:chOff x="2448148" y="1867646"/>
+            <a:chExt cx="7062741" cy="7078798"/>
           </a:xfrm>
         </p:grpSpPr>
         <p:sp>
           <p:nvSpPr>
-            <p:cNvPr id="37" name="Rectangle 36"/>
+            <p:cNvPr id="5" name="Rectangle 4"/>
             <p:cNvSpPr/>
             <p:nvPr/>
           </p:nvSpPr>
           <p:spPr>
-            <a:xfrm rot="13178596">
-              <a:off x="3124081" y="3468507"/>
-              <a:ext cx="289887" cy="591359"/>
+            <a:xfrm>
+              <a:off x="2448148" y="1867646"/>
+              <a:ext cx="7062741" cy="7078798"/>
             </a:xfrm>
             <a:prstGeom prst="rect">
               <a:avLst/>
             </a:prstGeom>
-            <a:solidFill>
-              <a:srgbClr val="FFEA79"/>
-            </a:solidFill>
+            <a:gradFill>
+              <a:gsLst>
+                <a:gs pos="0">
+                  <a:schemeClr val="tx2"/>
+                </a:gs>
+                <a:gs pos="100000">
+                  <a:schemeClr val="tx2">
+                    <a:lumMod val="60000"/>
+                    <a:lumOff val="40000"/>
+                  </a:schemeClr>
+                </a:gs>
+              </a:gsLst>
+            </a:gradFill>
             <a:ln>
               <a:noFill/>
             </a:ln>
@@ -32618,285 +32171,764 @@
             <a:bodyPr rtlCol="0" anchor="ctr"/>
             <a:lstStyle/>
             <a:p>
-              <a:pPr algn="ctr"/>
+              <a:pPr algn="just"/>
               <a:endParaRPr lang="en-US"/>
             </a:p>
           </p:txBody>
         </p:sp>
-        <p:sp>
-          <p:nvSpPr>
-            <p:cNvPr id="38" name="Rectangle 37"/>
-            <p:cNvSpPr/>
+        <p:grpSp>
+          <p:nvGrpSpPr>
+            <p:cNvPr id="6" name="Group 5"/>
+            <p:cNvGrpSpPr>
+              <a:grpSpLocks noChangeAspect="1"/>
+            </p:cNvGrpSpPr>
             <p:nvPr/>
-          </p:nvSpPr>
-          <p:spPr>
-            <a:xfrm rot="13178596">
-              <a:off x="3220970" y="3466641"/>
-              <a:ext cx="91604" cy="591359"/>
+          </p:nvGrpSpPr>
+          <p:grpSpPr>
+            <a:xfrm>
+              <a:off x="3783562" y="2833738"/>
+              <a:ext cx="4391913" cy="5146614"/>
+              <a:chOff x="2581221" y="2529154"/>
+              <a:chExt cx="1689193" cy="1979467"/>
             </a:xfrm>
-            <a:prstGeom prst="rect">
-              <a:avLst/>
-            </a:prstGeom>
-            <a:solidFill>
-              <a:srgbClr val="EAD66F"/>
-            </a:solidFill>
-            <a:ln>
-              <a:noFill/>
-            </a:ln>
-            <a:effectLst/>
-          </p:spPr>
-          <p:style>
-            <a:lnRef idx="1">
-              <a:schemeClr val="accent1"/>
-            </a:lnRef>
-            <a:fillRef idx="3">
-              <a:schemeClr val="accent1"/>
-            </a:fillRef>
-            <a:effectRef idx="2">
-              <a:schemeClr val="accent1"/>
-            </a:effectRef>
-            <a:fontRef idx="minor">
-              <a:schemeClr val="lt1"/>
-            </a:fontRef>
-          </p:style>
-          <p:txBody>
-            <a:bodyPr rtlCol="0" anchor="ctr"/>
-            <a:lstStyle/>
-            <a:p>
-              <a:pPr algn="ctr"/>
-              <a:endParaRPr lang="en-US"/>
-            </a:p>
-          </p:txBody>
-        </p:sp>
-        <p:sp>
-          <p:nvSpPr>
-            <p:cNvPr id="39" name="Rectangle 38"/>
-            <p:cNvSpPr/>
-            <p:nvPr/>
-          </p:nvSpPr>
-          <p:spPr>
-            <a:xfrm rot="13178596">
-              <a:off x="3334887" y="3475024"/>
-              <a:ext cx="289887" cy="69469"/>
-            </a:xfrm>
-            <a:prstGeom prst="rect">
-              <a:avLst/>
-            </a:prstGeom>
-            <a:solidFill>
-              <a:schemeClr val="bg1">
-                <a:lumMod val="50000"/>
-              </a:schemeClr>
-            </a:solidFill>
-            <a:ln>
-              <a:noFill/>
-            </a:ln>
-            <a:effectLst/>
-          </p:spPr>
-          <p:style>
-            <a:lnRef idx="1">
-              <a:schemeClr val="accent1"/>
-            </a:lnRef>
-            <a:fillRef idx="3">
-              <a:schemeClr val="accent1"/>
-            </a:fillRef>
-            <a:effectRef idx="2">
-              <a:schemeClr val="accent1"/>
-            </a:effectRef>
-            <a:fontRef idx="minor">
-              <a:schemeClr val="lt1"/>
-            </a:fontRef>
-          </p:style>
-          <p:txBody>
-            <a:bodyPr rtlCol="0" anchor="ctr"/>
-            <a:lstStyle/>
-            <a:p>
-              <a:pPr algn="ctr"/>
-              <a:endParaRPr lang="en-US"/>
-            </a:p>
-          </p:txBody>
-        </p:sp>
-        <p:sp>
-          <p:nvSpPr>
-            <p:cNvPr id="40" name="Rounded Rectangle 39"/>
-            <p:cNvSpPr/>
-            <p:nvPr/>
-          </p:nvSpPr>
-          <p:spPr>
-            <a:xfrm rot="13178596">
-              <a:off x="3379326" y="3390996"/>
-              <a:ext cx="289887" cy="130256"/>
-            </a:xfrm>
-            <a:prstGeom prst="roundRect">
-              <a:avLst/>
-            </a:prstGeom>
-            <a:solidFill>
-              <a:srgbClr val="E88E9D"/>
-            </a:solidFill>
-            <a:ln>
-              <a:noFill/>
-            </a:ln>
-            <a:effectLst/>
-          </p:spPr>
-          <p:style>
-            <a:lnRef idx="1">
-              <a:schemeClr val="accent1"/>
-            </a:lnRef>
-            <a:fillRef idx="3">
-              <a:schemeClr val="accent1"/>
-            </a:fillRef>
-            <a:effectRef idx="2">
-              <a:schemeClr val="accent1"/>
-            </a:effectRef>
-            <a:fontRef idx="minor">
-              <a:schemeClr val="lt1"/>
-            </a:fontRef>
-          </p:style>
-          <p:txBody>
-            <a:bodyPr rtlCol="0" anchor="ctr"/>
-            <a:lstStyle/>
-            <a:p>
-              <a:pPr algn="ctr"/>
-              <a:endParaRPr lang="en-US"/>
-            </a:p>
-          </p:txBody>
-        </p:sp>
-        <p:sp>
-          <p:nvSpPr>
-            <p:cNvPr id="41" name="Isosceles Triangle 40"/>
-            <p:cNvSpPr/>
-            <p:nvPr/>
-          </p:nvSpPr>
-          <p:spPr>
-            <a:xfrm rot="13178596">
-              <a:off x="2858712" y="3964215"/>
-              <a:ext cx="289887" cy="240510"/>
-            </a:xfrm>
-            <a:prstGeom prst="triangle">
-              <a:avLst/>
-            </a:prstGeom>
-            <a:solidFill>
-              <a:schemeClr val="bg2">
-                <a:lumMod val="90000"/>
-              </a:schemeClr>
-            </a:solidFill>
-            <a:ln>
-              <a:noFill/>
-            </a:ln>
-            <a:effectLst/>
-          </p:spPr>
-          <p:style>
-            <a:lnRef idx="1">
-              <a:schemeClr val="accent1"/>
-            </a:lnRef>
-            <a:fillRef idx="3">
-              <a:schemeClr val="accent1"/>
-            </a:fillRef>
-            <a:effectRef idx="2">
-              <a:schemeClr val="accent1"/>
-            </a:effectRef>
-            <a:fontRef idx="minor">
-              <a:schemeClr val="lt1"/>
-            </a:fontRef>
-          </p:style>
-          <p:txBody>
-            <a:bodyPr rtlCol="0" anchor="ctr"/>
-            <a:lstStyle/>
-            <a:p>
-              <a:pPr algn="ctr"/>
-              <a:endParaRPr lang="en-US"/>
-            </a:p>
-          </p:txBody>
-        </p:sp>
-        <p:sp>
-          <p:nvSpPr>
-            <p:cNvPr id="42" name="Isosceles Triangle 41"/>
-            <p:cNvSpPr/>
-            <p:nvPr/>
-          </p:nvSpPr>
-          <p:spPr>
-            <a:xfrm rot="13178596">
-              <a:off x="2896143" y="4094893"/>
-              <a:ext cx="113837" cy="102097"/>
-            </a:xfrm>
-            <a:prstGeom prst="triangle">
-              <a:avLst/>
-            </a:prstGeom>
-            <a:solidFill>
-              <a:schemeClr val="tx1"/>
-            </a:solidFill>
-            <a:ln>
-              <a:noFill/>
-            </a:ln>
-            <a:effectLst/>
-          </p:spPr>
-          <p:style>
-            <a:lnRef idx="1">
-              <a:schemeClr val="accent1"/>
-            </a:lnRef>
-            <a:fillRef idx="3">
-              <a:schemeClr val="accent1"/>
-            </a:fillRef>
-            <a:effectRef idx="2">
-              <a:schemeClr val="accent1"/>
-            </a:effectRef>
-            <a:fontRef idx="minor">
-              <a:schemeClr val="lt1"/>
-            </a:fontRef>
-          </p:style>
-          <p:txBody>
-            <a:bodyPr rtlCol="0" anchor="ctr"/>
-            <a:lstStyle/>
-            <a:p>
-              <a:pPr algn="ctr"/>
-              <a:endParaRPr lang="en-US"/>
-            </a:p>
-          </p:txBody>
-        </p:sp>
-        <p:sp>
-          <p:nvSpPr>
-            <p:cNvPr id="43" name="Rectangle 42"/>
-            <p:cNvSpPr/>
-            <p:nvPr/>
-          </p:nvSpPr>
-          <p:spPr>
-            <a:xfrm rot="13178596">
-              <a:off x="3375602" y="3397737"/>
-              <a:ext cx="289887" cy="125760"/>
-            </a:xfrm>
-            <a:prstGeom prst="rect">
-              <a:avLst/>
-            </a:prstGeom>
-            <a:solidFill>
-              <a:srgbClr val="E88E9D"/>
-            </a:solidFill>
-            <a:ln>
-              <a:noFill/>
-            </a:ln>
-            <a:effectLst/>
-          </p:spPr>
-          <p:style>
-            <a:lnRef idx="1">
-              <a:schemeClr val="accent1"/>
-            </a:lnRef>
-            <a:fillRef idx="3">
-              <a:schemeClr val="accent1"/>
-            </a:fillRef>
-            <a:effectRef idx="2">
-              <a:schemeClr val="accent1"/>
-            </a:effectRef>
-            <a:fontRef idx="minor">
-              <a:schemeClr val="lt1"/>
-            </a:fontRef>
-          </p:style>
-          <p:txBody>
-            <a:bodyPr rtlCol="0" anchor="ctr"/>
-            <a:lstStyle/>
-            <a:p>
-              <a:pPr algn="ctr"/>
-              <a:endParaRPr lang="en-US"/>
-            </a:p>
-          </p:txBody>
-        </p:sp>
+          </p:grpSpPr>
+          <p:sp>
+            <p:nvSpPr>
+              <p:cNvPr id="4" name="Rectangle 3"/>
+              <p:cNvSpPr/>
+              <p:nvPr/>
+            </p:nvSpPr>
+            <p:spPr>
+              <a:xfrm>
+                <a:off x="2712114" y="2529154"/>
+                <a:ext cx="1073825" cy="744512"/>
+              </a:xfrm>
+              <a:prstGeom prst="rect">
+                <a:avLst/>
+              </a:prstGeom>
+              <a:solidFill>
+                <a:schemeClr val="bg1"/>
+              </a:solidFill>
+              <a:ln>
+                <a:noFill/>
+              </a:ln>
+              <a:effectLst/>
+            </p:spPr>
+            <p:style>
+              <a:lnRef idx="1">
+                <a:schemeClr val="accent1"/>
+              </a:lnRef>
+              <a:fillRef idx="3">
+                <a:schemeClr val="accent1"/>
+              </a:fillRef>
+              <a:effectRef idx="2">
+                <a:schemeClr val="accent1"/>
+              </a:effectRef>
+              <a:fontRef idx="minor">
+                <a:schemeClr val="lt1"/>
+              </a:fontRef>
+            </p:style>
+            <p:txBody>
+              <a:bodyPr rtlCol="0" anchor="ctr"/>
+              <a:lstStyle/>
+              <a:p>
+                <a:pPr algn="just"/>
+                <a:endParaRPr lang="en-US"/>
+              </a:p>
+            </p:txBody>
+          </p:sp>
+          <p:sp>
+            <p:nvSpPr>
+              <p:cNvPr id="12" name="Rounded Rectangle 11"/>
+              <p:cNvSpPr/>
+              <p:nvPr/>
+            </p:nvSpPr>
+            <p:spPr>
+              <a:xfrm>
+                <a:off x="3679361" y="3069949"/>
+                <a:ext cx="340188" cy="117844"/>
+              </a:xfrm>
+              <a:prstGeom prst="roundRect">
+                <a:avLst/>
+              </a:prstGeom>
+              <a:solidFill>
+                <a:srgbClr val="FFFFFF"/>
+              </a:solidFill>
+              <a:ln>
+                <a:noFill/>
+              </a:ln>
+              <a:effectLst/>
+            </p:spPr>
+            <p:style>
+              <a:lnRef idx="1">
+                <a:schemeClr val="accent1"/>
+              </a:lnRef>
+              <a:fillRef idx="3">
+                <a:schemeClr val="accent1"/>
+              </a:fillRef>
+              <a:effectRef idx="2">
+                <a:schemeClr val="accent1"/>
+              </a:effectRef>
+              <a:fontRef idx="minor">
+                <a:schemeClr val="lt1"/>
+              </a:fontRef>
+            </p:style>
+            <p:txBody>
+              <a:bodyPr rtlCol="0" anchor="ctr"/>
+              <a:lstStyle/>
+              <a:p>
+                <a:pPr algn="just"/>
+                <a:endParaRPr lang="en-US"/>
+              </a:p>
+            </p:txBody>
+          </p:sp>
+          <p:sp>
+            <p:nvSpPr>
+              <p:cNvPr id="2" name="Rectangle 1"/>
+              <p:cNvSpPr/>
+              <p:nvPr/>
+            </p:nvSpPr>
+            <p:spPr>
+              <a:xfrm>
+                <a:off x="2581221" y="4307148"/>
+                <a:ext cx="1335610" cy="201473"/>
+              </a:xfrm>
+              <a:prstGeom prst="rect">
+                <a:avLst/>
+              </a:prstGeom>
+              <a:solidFill>
+                <a:srgbClr val="FFFFFF"/>
+              </a:solidFill>
+              <a:ln>
+                <a:noFill/>
+              </a:ln>
+              <a:effectLst/>
+            </p:spPr>
+            <p:style>
+              <a:lnRef idx="1">
+                <a:schemeClr val="accent1"/>
+              </a:lnRef>
+              <a:fillRef idx="3">
+                <a:schemeClr val="accent1"/>
+              </a:fillRef>
+              <a:effectRef idx="2">
+                <a:schemeClr val="accent1"/>
+              </a:effectRef>
+              <a:fontRef idx="minor">
+                <a:schemeClr val="lt1"/>
+              </a:fontRef>
+            </p:style>
+            <p:txBody>
+              <a:bodyPr rtlCol="0" anchor="ctr"/>
+              <a:lstStyle/>
+              <a:p>
+                <a:pPr algn="just"/>
+                <a:endParaRPr lang="en-US"/>
+              </a:p>
+            </p:txBody>
+          </p:sp>
+          <p:sp>
+            <p:nvSpPr>
+              <p:cNvPr id="9" name="Rectangle 8"/>
+              <p:cNvSpPr/>
+              <p:nvPr/>
+            </p:nvSpPr>
+            <p:spPr>
+              <a:xfrm>
+                <a:off x="2899666" y="2683752"/>
+                <a:ext cx="698721" cy="470807"/>
+              </a:xfrm>
+              <a:prstGeom prst="rect">
+                <a:avLst/>
+              </a:prstGeom>
+              <a:ln>
+                <a:noFill/>
+              </a:ln>
+              <a:effectLst/>
+            </p:spPr>
+            <p:style>
+              <a:lnRef idx="1">
+                <a:schemeClr val="accent1"/>
+              </a:lnRef>
+              <a:fillRef idx="3">
+                <a:schemeClr val="accent1"/>
+              </a:fillRef>
+              <a:effectRef idx="2">
+                <a:schemeClr val="accent1"/>
+              </a:effectRef>
+              <a:fontRef idx="minor">
+                <a:schemeClr val="lt1"/>
+              </a:fontRef>
+            </p:style>
+            <p:txBody>
+              <a:bodyPr rtlCol="0" anchor="ctr"/>
+              <a:lstStyle/>
+              <a:p>
+                <a:pPr algn="just"/>
+                <a:endParaRPr lang="en-US"/>
+              </a:p>
+            </p:txBody>
+          </p:sp>
+          <p:sp>
+            <p:nvSpPr>
+              <p:cNvPr id="20" name="Rounded Rectangle 19"/>
+              <p:cNvSpPr/>
+              <p:nvPr/>
+            </p:nvSpPr>
+            <p:spPr>
+              <a:xfrm rot="3219055">
+                <a:off x="3907823" y="2906710"/>
+                <a:ext cx="413246" cy="88813"/>
+              </a:xfrm>
+              <a:prstGeom prst="roundRect">
+                <a:avLst/>
+              </a:prstGeom>
+              <a:solidFill>
+                <a:srgbClr val="FFFFFF"/>
+              </a:solidFill>
+              <a:ln>
+                <a:noFill/>
+              </a:ln>
+              <a:effectLst/>
+            </p:spPr>
+            <p:style>
+              <a:lnRef idx="1">
+                <a:schemeClr val="accent1"/>
+              </a:lnRef>
+              <a:fillRef idx="3">
+                <a:schemeClr val="accent1"/>
+              </a:fillRef>
+              <a:effectRef idx="2">
+                <a:schemeClr val="accent1"/>
+              </a:effectRef>
+              <a:fontRef idx="minor">
+                <a:schemeClr val="lt1"/>
+              </a:fontRef>
+            </p:style>
+            <p:txBody>
+              <a:bodyPr rtlCol="0" anchor="ctr"/>
+              <a:lstStyle/>
+              <a:p>
+                <a:pPr algn="just"/>
+                <a:endParaRPr lang="en-US"/>
+              </a:p>
+            </p:txBody>
+          </p:sp>
+          <p:sp>
+            <p:nvSpPr>
+              <p:cNvPr id="24" name="Rounded Rectangle 23"/>
+              <p:cNvSpPr/>
+              <p:nvPr/>
+            </p:nvSpPr>
+            <p:spPr>
+              <a:xfrm>
+                <a:off x="3953987" y="3070062"/>
+                <a:ext cx="100396" cy="1162485"/>
+              </a:xfrm>
+              <a:prstGeom prst="roundRect">
+                <a:avLst/>
+              </a:prstGeom>
+              <a:solidFill>
+                <a:schemeClr val="bg1"/>
+              </a:solidFill>
+              <a:ln>
+                <a:noFill/>
+              </a:ln>
+              <a:effectLst/>
+            </p:spPr>
+            <p:style>
+              <a:lnRef idx="1">
+                <a:schemeClr val="accent1"/>
+              </a:lnRef>
+              <a:fillRef idx="3">
+                <a:schemeClr val="accent1"/>
+              </a:fillRef>
+              <a:effectRef idx="2">
+                <a:schemeClr val="accent1"/>
+              </a:effectRef>
+              <a:fontRef idx="minor">
+                <a:schemeClr val="lt1"/>
+              </a:fontRef>
+            </p:style>
+            <p:txBody>
+              <a:bodyPr rtlCol="0" anchor="ctr"/>
+              <a:lstStyle/>
+              <a:p>
+                <a:pPr algn="just"/>
+                <a:endParaRPr lang="en-US"/>
+              </a:p>
+            </p:txBody>
+          </p:sp>
+          <p:sp>
+            <p:nvSpPr>
+              <p:cNvPr id="35" name="Rounded Rectangle 34"/>
+              <p:cNvSpPr/>
+              <p:nvPr/>
+            </p:nvSpPr>
+            <p:spPr>
+              <a:xfrm rot="5400000">
+                <a:off x="4069514" y="4036470"/>
+                <a:ext cx="100396" cy="291760"/>
+              </a:xfrm>
+              <a:prstGeom prst="roundRect">
+                <a:avLst/>
+              </a:prstGeom>
+              <a:solidFill>
+                <a:schemeClr val="bg1"/>
+              </a:solidFill>
+              <a:ln>
+                <a:noFill/>
+              </a:ln>
+              <a:effectLst/>
+            </p:spPr>
+            <p:style>
+              <a:lnRef idx="1">
+                <a:schemeClr val="accent1"/>
+              </a:lnRef>
+              <a:fillRef idx="3">
+                <a:schemeClr val="accent1"/>
+              </a:fillRef>
+              <a:effectRef idx="2">
+                <a:schemeClr val="accent1"/>
+              </a:effectRef>
+              <a:fontRef idx="minor">
+                <a:schemeClr val="lt1"/>
+              </a:fontRef>
+            </p:style>
+            <p:txBody>
+              <a:bodyPr rtlCol="0" anchor="ctr"/>
+              <a:lstStyle/>
+              <a:p>
+                <a:pPr algn="just"/>
+                <a:endParaRPr lang="en-US"/>
+              </a:p>
+            </p:txBody>
+          </p:sp>
+          <p:sp>
+            <p:nvSpPr>
+              <p:cNvPr id="36" name="Rounded Rectangle 35"/>
+              <p:cNvSpPr/>
+              <p:nvPr/>
+            </p:nvSpPr>
+            <p:spPr>
+              <a:xfrm>
+                <a:off x="4170018" y="3069949"/>
+                <a:ext cx="100396" cy="1162599"/>
+              </a:xfrm>
+              <a:prstGeom prst="roundRect">
+                <a:avLst/>
+              </a:prstGeom>
+              <a:solidFill>
+                <a:schemeClr val="bg1"/>
+              </a:solidFill>
+              <a:ln>
+                <a:noFill/>
+              </a:ln>
+              <a:effectLst/>
+            </p:spPr>
+            <p:style>
+              <a:lnRef idx="1">
+                <a:schemeClr val="accent1"/>
+              </a:lnRef>
+              <a:fillRef idx="3">
+                <a:schemeClr val="accent1"/>
+              </a:fillRef>
+              <a:effectRef idx="2">
+                <a:schemeClr val="accent1"/>
+              </a:effectRef>
+              <a:fontRef idx="minor">
+                <a:schemeClr val="lt1"/>
+              </a:fontRef>
+            </p:style>
+            <p:txBody>
+              <a:bodyPr rtlCol="0" anchor="ctr"/>
+              <a:lstStyle/>
+              <a:p>
+                <a:pPr algn="just"/>
+                <a:endParaRPr lang="en-US"/>
+              </a:p>
+            </p:txBody>
+          </p:sp>
+          <p:sp>
+            <p:nvSpPr>
+              <p:cNvPr id="18" name="Rectangle 17"/>
+              <p:cNvSpPr/>
+              <p:nvPr/>
+            </p:nvSpPr>
+            <p:spPr>
+              <a:xfrm>
+                <a:off x="2757134" y="3187793"/>
+                <a:ext cx="983785" cy="1186218"/>
+              </a:xfrm>
+              <a:prstGeom prst="rect">
+                <a:avLst/>
+              </a:prstGeom>
+              <a:solidFill>
+                <a:schemeClr val="bg1"/>
+              </a:solidFill>
+              <a:ln>
+                <a:noFill/>
+              </a:ln>
+              <a:effectLst/>
+            </p:spPr>
+            <p:style>
+              <a:lnRef idx="1">
+                <a:schemeClr val="accent1"/>
+              </a:lnRef>
+              <a:fillRef idx="3">
+                <a:schemeClr val="accent1"/>
+              </a:fillRef>
+              <a:effectRef idx="2">
+                <a:schemeClr val="accent1"/>
+              </a:effectRef>
+              <a:fontRef idx="minor">
+                <a:schemeClr val="lt1"/>
+              </a:fontRef>
+            </p:style>
+            <p:txBody>
+              <a:bodyPr rtlCol="0" anchor="ctr"/>
+              <a:lstStyle/>
+              <a:p>
+                <a:pPr algn="just"/>
+                <a:endParaRPr lang="en-US"/>
+              </a:p>
+            </p:txBody>
+          </p:sp>
+          <p:grpSp>
+            <p:nvGrpSpPr>
+              <p:cNvPr id="3" name="Group 2"/>
+              <p:cNvGrpSpPr/>
+              <p:nvPr/>
+            </p:nvGrpSpPr>
+            <p:grpSpPr>
+              <a:xfrm>
+                <a:off x="2843776" y="3390996"/>
+                <a:ext cx="810501" cy="813729"/>
+                <a:chOff x="2858712" y="3390996"/>
+                <a:chExt cx="810501" cy="813729"/>
+              </a:xfrm>
+            </p:grpSpPr>
+            <p:sp>
+              <p:nvSpPr>
+                <p:cNvPr id="37" name="Rectangle 36"/>
+                <p:cNvSpPr/>
+                <p:nvPr/>
+              </p:nvSpPr>
+              <p:spPr>
+                <a:xfrm rot="13178596">
+                  <a:off x="3124081" y="3468507"/>
+                  <a:ext cx="289887" cy="591359"/>
+                </a:xfrm>
+                <a:prstGeom prst="rect">
+                  <a:avLst/>
+                </a:prstGeom>
+                <a:solidFill>
+                  <a:srgbClr val="FFEA79"/>
+                </a:solidFill>
+                <a:ln>
+                  <a:noFill/>
+                </a:ln>
+                <a:effectLst/>
+              </p:spPr>
+              <p:style>
+                <a:lnRef idx="1">
+                  <a:schemeClr val="accent1"/>
+                </a:lnRef>
+                <a:fillRef idx="3">
+                  <a:schemeClr val="accent1"/>
+                </a:fillRef>
+                <a:effectRef idx="2">
+                  <a:schemeClr val="accent1"/>
+                </a:effectRef>
+                <a:fontRef idx="minor">
+                  <a:schemeClr val="lt1"/>
+                </a:fontRef>
+              </p:style>
+              <p:txBody>
+                <a:bodyPr rtlCol="0" anchor="ctr"/>
+                <a:lstStyle/>
+                <a:p>
+                  <a:pPr algn="just"/>
+                  <a:endParaRPr lang="en-US"/>
+                </a:p>
+              </p:txBody>
+            </p:sp>
+            <p:sp>
+              <p:nvSpPr>
+                <p:cNvPr id="38" name="Rectangle 37"/>
+                <p:cNvSpPr/>
+                <p:nvPr/>
+              </p:nvSpPr>
+              <p:spPr>
+                <a:xfrm rot="13178596">
+                  <a:off x="3220970" y="3466641"/>
+                  <a:ext cx="91604" cy="591359"/>
+                </a:xfrm>
+                <a:prstGeom prst="rect">
+                  <a:avLst/>
+                </a:prstGeom>
+                <a:solidFill>
+                  <a:srgbClr val="EAD66F"/>
+                </a:solidFill>
+                <a:ln>
+                  <a:noFill/>
+                </a:ln>
+                <a:effectLst/>
+              </p:spPr>
+              <p:style>
+                <a:lnRef idx="1">
+                  <a:schemeClr val="accent1"/>
+                </a:lnRef>
+                <a:fillRef idx="3">
+                  <a:schemeClr val="accent1"/>
+                </a:fillRef>
+                <a:effectRef idx="2">
+                  <a:schemeClr val="accent1"/>
+                </a:effectRef>
+                <a:fontRef idx="minor">
+                  <a:schemeClr val="lt1"/>
+                </a:fontRef>
+              </p:style>
+              <p:txBody>
+                <a:bodyPr rtlCol="0" anchor="ctr"/>
+                <a:lstStyle/>
+                <a:p>
+                  <a:pPr algn="just"/>
+                  <a:endParaRPr lang="en-US"/>
+                </a:p>
+              </p:txBody>
+            </p:sp>
+            <p:sp>
+              <p:nvSpPr>
+                <p:cNvPr id="39" name="Rectangle 38"/>
+                <p:cNvSpPr/>
+                <p:nvPr/>
+              </p:nvSpPr>
+              <p:spPr>
+                <a:xfrm rot="13178596">
+                  <a:off x="3334887" y="3475024"/>
+                  <a:ext cx="289887" cy="69469"/>
+                </a:xfrm>
+                <a:prstGeom prst="rect">
+                  <a:avLst/>
+                </a:prstGeom>
+                <a:solidFill>
+                  <a:schemeClr val="bg1">
+                    <a:lumMod val="50000"/>
+                  </a:schemeClr>
+                </a:solidFill>
+                <a:ln>
+                  <a:noFill/>
+                </a:ln>
+                <a:effectLst/>
+              </p:spPr>
+              <p:style>
+                <a:lnRef idx="1">
+                  <a:schemeClr val="accent1"/>
+                </a:lnRef>
+                <a:fillRef idx="3">
+                  <a:schemeClr val="accent1"/>
+                </a:fillRef>
+                <a:effectRef idx="2">
+                  <a:schemeClr val="accent1"/>
+                </a:effectRef>
+                <a:fontRef idx="minor">
+                  <a:schemeClr val="lt1"/>
+                </a:fontRef>
+              </p:style>
+              <p:txBody>
+                <a:bodyPr rtlCol="0" anchor="ctr"/>
+                <a:lstStyle/>
+                <a:p>
+                  <a:pPr algn="just"/>
+                  <a:endParaRPr lang="en-US"/>
+                </a:p>
+              </p:txBody>
+            </p:sp>
+            <p:sp>
+              <p:nvSpPr>
+                <p:cNvPr id="40" name="Rounded Rectangle 39"/>
+                <p:cNvSpPr/>
+                <p:nvPr/>
+              </p:nvSpPr>
+              <p:spPr>
+                <a:xfrm rot="13178596">
+                  <a:off x="3379326" y="3390996"/>
+                  <a:ext cx="289887" cy="130256"/>
+                </a:xfrm>
+                <a:prstGeom prst="roundRect">
+                  <a:avLst/>
+                </a:prstGeom>
+                <a:solidFill>
+                  <a:srgbClr val="E88E9D"/>
+                </a:solidFill>
+                <a:ln>
+                  <a:noFill/>
+                </a:ln>
+                <a:effectLst/>
+              </p:spPr>
+              <p:style>
+                <a:lnRef idx="1">
+                  <a:schemeClr val="accent1"/>
+                </a:lnRef>
+                <a:fillRef idx="3">
+                  <a:schemeClr val="accent1"/>
+                </a:fillRef>
+                <a:effectRef idx="2">
+                  <a:schemeClr val="accent1"/>
+                </a:effectRef>
+                <a:fontRef idx="minor">
+                  <a:schemeClr val="lt1"/>
+                </a:fontRef>
+              </p:style>
+              <p:txBody>
+                <a:bodyPr rtlCol="0" anchor="ctr"/>
+                <a:lstStyle/>
+                <a:p>
+                  <a:pPr algn="just"/>
+                  <a:endParaRPr lang="en-US"/>
+                </a:p>
+              </p:txBody>
+            </p:sp>
+            <p:sp>
+              <p:nvSpPr>
+                <p:cNvPr id="41" name="Isosceles Triangle 40"/>
+                <p:cNvSpPr/>
+                <p:nvPr/>
+              </p:nvSpPr>
+              <p:spPr>
+                <a:xfrm rot="13178596">
+                  <a:off x="2858712" y="3964215"/>
+                  <a:ext cx="289887" cy="240510"/>
+                </a:xfrm>
+                <a:prstGeom prst="triangle">
+                  <a:avLst/>
+                </a:prstGeom>
+                <a:solidFill>
+                  <a:schemeClr val="bg2">
+                    <a:lumMod val="90000"/>
+                  </a:schemeClr>
+                </a:solidFill>
+                <a:ln>
+                  <a:noFill/>
+                </a:ln>
+                <a:effectLst/>
+              </p:spPr>
+              <p:style>
+                <a:lnRef idx="1">
+                  <a:schemeClr val="accent1"/>
+                </a:lnRef>
+                <a:fillRef idx="3">
+                  <a:schemeClr val="accent1"/>
+                </a:fillRef>
+                <a:effectRef idx="2">
+                  <a:schemeClr val="accent1"/>
+                </a:effectRef>
+                <a:fontRef idx="minor">
+                  <a:schemeClr val="lt1"/>
+                </a:fontRef>
+              </p:style>
+              <p:txBody>
+                <a:bodyPr rtlCol="0" anchor="ctr"/>
+                <a:lstStyle/>
+                <a:p>
+                  <a:pPr algn="just"/>
+                  <a:endParaRPr lang="en-US"/>
+                </a:p>
+              </p:txBody>
+            </p:sp>
+            <p:sp>
+              <p:nvSpPr>
+                <p:cNvPr id="42" name="Isosceles Triangle 41"/>
+                <p:cNvSpPr/>
+                <p:nvPr/>
+              </p:nvSpPr>
+              <p:spPr>
+                <a:xfrm rot="13178596">
+                  <a:off x="2896143" y="4094893"/>
+                  <a:ext cx="113837" cy="102097"/>
+                </a:xfrm>
+                <a:prstGeom prst="triangle">
+                  <a:avLst/>
+                </a:prstGeom>
+                <a:solidFill>
+                  <a:schemeClr val="tx1"/>
+                </a:solidFill>
+                <a:ln>
+                  <a:noFill/>
+                </a:ln>
+                <a:effectLst/>
+              </p:spPr>
+              <p:style>
+                <a:lnRef idx="1">
+                  <a:schemeClr val="accent1"/>
+                </a:lnRef>
+                <a:fillRef idx="3">
+                  <a:schemeClr val="accent1"/>
+                </a:fillRef>
+                <a:effectRef idx="2">
+                  <a:schemeClr val="accent1"/>
+                </a:effectRef>
+                <a:fontRef idx="minor">
+                  <a:schemeClr val="lt1"/>
+                </a:fontRef>
+              </p:style>
+              <p:txBody>
+                <a:bodyPr rtlCol="0" anchor="ctr"/>
+                <a:lstStyle/>
+                <a:p>
+                  <a:pPr algn="just"/>
+                  <a:endParaRPr lang="en-US"/>
+                </a:p>
+              </p:txBody>
+            </p:sp>
+            <p:sp>
+              <p:nvSpPr>
+                <p:cNvPr id="43" name="Rectangle 42"/>
+                <p:cNvSpPr/>
+                <p:nvPr/>
+              </p:nvSpPr>
+              <p:spPr>
+                <a:xfrm rot="13178596">
+                  <a:off x="3375602" y="3397737"/>
+                  <a:ext cx="289887" cy="125760"/>
+                </a:xfrm>
+                <a:prstGeom prst="rect">
+                  <a:avLst/>
+                </a:prstGeom>
+                <a:solidFill>
+                  <a:srgbClr val="E88E9D"/>
+                </a:solidFill>
+                <a:ln>
+                  <a:noFill/>
+                </a:ln>
+                <a:effectLst/>
+              </p:spPr>
+              <p:style>
+                <a:lnRef idx="1">
+                  <a:schemeClr val="accent1"/>
+                </a:lnRef>
+                <a:fillRef idx="3">
+                  <a:schemeClr val="accent1"/>
+                </a:fillRef>
+                <a:effectRef idx="2">
+                  <a:schemeClr val="accent1"/>
+                </a:effectRef>
+                <a:fontRef idx="minor">
+                  <a:schemeClr val="lt1"/>
+                </a:fontRef>
+              </p:style>
+              <p:txBody>
+                <a:bodyPr rtlCol="0" anchor="ctr"/>
+                <a:lstStyle/>
+                <a:p>
+                  <a:pPr algn="just"/>
+                  <a:endParaRPr lang="en-US"/>
+                </a:p>
+              </p:txBody>
+            </p:sp>
+          </p:grpSp>
+        </p:grpSp>
       </p:grpSp>
     </p:spTree>
     <p:extLst>

</xml_diff>